<commit_message>
Bump version: 0.7.0 → 0.8.0
</commit_message>
<xml_diff>
--- a/doc/rsenv.pptx
+++ b/doc/rsenv.pptx
@@ -266,7 +266,7 @@
           <a:p>
             <a:fld id="{94EAEABD-DE79-9141-AFA2-A3447ADAF287}" type="datetimeFigureOut">
               <a:rPr lang="en-DE" smtClean="0"/>
-              <a:t>31.08.23</a:t>
+              <a:t>01.09.23</a:t>
             </a:fld>
             <a:endParaRPr lang="en-DE"/>
           </a:p>
@@ -466,7 +466,7 @@
           <a:p>
             <a:fld id="{94EAEABD-DE79-9141-AFA2-A3447ADAF287}" type="datetimeFigureOut">
               <a:rPr lang="en-DE" smtClean="0"/>
-              <a:t>31.08.23</a:t>
+              <a:t>01.09.23</a:t>
             </a:fld>
             <a:endParaRPr lang="en-DE"/>
           </a:p>
@@ -742,7 +742,7 @@
           <a:p>
             <a:fld id="{94EAEABD-DE79-9141-AFA2-A3447ADAF287}" type="datetimeFigureOut">
               <a:rPr lang="en-DE" smtClean="0"/>
-              <a:t>31.08.23</a:t>
+              <a:t>01.09.23</a:t>
             </a:fld>
             <a:endParaRPr lang="en-DE"/>
           </a:p>
@@ -1010,7 +1010,7 @@
           <a:p>
             <a:fld id="{94EAEABD-DE79-9141-AFA2-A3447ADAF287}" type="datetimeFigureOut">
               <a:rPr lang="en-DE" smtClean="0"/>
-              <a:t>31.08.23</a:t>
+              <a:t>01.09.23</a:t>
             </a:fld>
             <a:endParaRPr lang="en-DE"/>
           </a:p>
@@ -1425,7 +1425,7 @@
           <a:p>
             <a:fld id="{94EAEABD-DE79-9141-AFA2-A3447ADAF287}" type="datetimeFigureOut">
               <a:rPr lang="en-DE" smtClean="0"/>
-              <a:t>31.08.23</a:t>
+              <a:t>01.09.23</a:t>
             </a:fld>
             <a:endParaRPr lang="en-DE"/>
           </a:p>
@@ -1572,7 +1572,7 @@
           <a:p>
             <a:fld id="{94EAEABD-DE79-9141-AFA2-A3447ADAF287}" type="datetimeFigureOut">
               <a:rPr lang="en-DE" smtClean="0"/>
-              <a:t>31.08.23</a:t>
+              <a:t>01.09.23</a:t>
             </a:fld>
             <a:endParaRPr lang="en-DE"/>
           </a:p>
@@ -1685,7 +1685,7 @@
           <a:p>
             <a:fld id="{94EAEABD-DE79-9141-AFA2-A3447ADAF287}" type="datetimeFigureOut">
               <a:rPr lang="en-DE" smtClean="0"/>
-              <a:t>31.08.23</a:t>
+              <a:t>01.09.23</a:t>
             </a:fld>
             <a:endParaRPr lang="en-DE"/>
           </a:p>
@@ -1934,7 +1934,7 @@
           <a:p>
             <a:fld id="{94EAEABD-DE79-9141-AFA2-A3447ADAF287}" type="datetimeFigureOut">
               <a:rPr lang="en-DE" smtClean="0"/>
-              <a:t>31.08.23</a:t>
+              <a:t>01.09.23</a:t>
             </a:fld>
             <a:endParaRPr lang="en-DE"/>
           </a:p>
@@ -4866,6 +4866,141 @@
       </p:grpSpPr>
       <p:sp>
         <p:nvSpPr>
+          <p:cNvPr id="9" name="TextBox 8">
+            <a:extLst>
+              <a:ext uri="{FF2B5EF4-FFF2-40B4-BE49-F238E27FC236}">
+                <a16:creationId xmlns:a16="http://schemas.microsoft.com/office/drawing/2014/main" id="{08689DEE-21DC-CFCB-561B-A7A0310892AC}"/>
+              </a:ext>
+            </a:extLst>
+          </p:cNvPr>
+          <p:cNvSpPr txBox="1"/>
+          <p:nvPr/>
+        </p:nvSpPr>
+        <p:spPr>
+          <a:xfrm>
+            <a:off x="4755973" y="1648494"/>
+            <a:ext cx="2133384" cy="4117605"/>
+          </a:xfrm>
+          <a:prstGeom prst="rect">
+            <a:avLst/>
+          </a:prstGeom>
+          <a:noFill/>
+          <a:ln>
+            <a:solidFill>
+              <a:srgbClr val="002060"/>
+            </a:solidFill>
+          </a:ln>
+        </p:spPr>
+        <p:txBody>
+          <a:bodyPr wrap="square" rtlCol="0">
+            <a:noAutofit/>
+          </a:bodyPr>
+          <a:lstStyle/>
+          <a:p>
+            <a:pPr algn="ctr"/>
+            <a:r>
+              <a:rPr lang="en-DE" sz="1400" dirty="0">
+                <a:solidFill>
+                  <a:srgbClr val="002060"/>
+                </a:solidFill>
+              </a:rPr>
+              <a:t>Logical Dependency</a:t>
+            </a:r>
+          </a:p>
+        </p:txBody>
+      </p:sp>
+      <p:sp>
+        <p:nvSpPr>
+          <p:cNvPr id="10" name="TextBox 9">
+            <a:extLst>
+              <a:ext uri="{FF2B5EF4-FFF2-40B4-BE49-F238E27FC236}">
+                <a16:creationId xmlns:a16="http://schemas.microsoft.com/office/drawing/2014/main" id="{39481C4E-F20E-63A1-B117-287F64B7BBAC}"/>
+              </a:ext>
+            </a:extLst>
+          </p:cNvPr>
+          <p:cNvSpPr txBox="1"/>
+          <p:nvPr/>
+        </p:nvSpPr>
+        <p:spPr>
+          <a:xfrm>
+            <a:off x="6889357" y="1648494"/>
+            <a:ext cx="2133384" cy="4117605"/>
+          </a:xfrm>
+          <a:prstGeom prst="rect">
+            <a:avLst/>
+          </a:prstGeom>
+          <a:noFill/>
+          <a:ln>
+            <a:solidFill>
+              <a:srgbClr val="002060"/>
+            </a:solidFill>
+          </a:ln>
+        </p:spPr>
+        <p:txBody>
+          <a:bodyPr wrap="square" rtlCol="0">
+            <a:noAutofit/>
+          </a:bodyPr>
+          <a:lstStyle/>
+          <a:p>
+            <a:pPr algn="ctr"/>
+            <a:r>
+              <a:rPr lang="en-DE" sz="1400" dirty="0">
+                <a:solidFill>
+                  <a:srgbClr val="002060"/>
+                </a:solidFill>
+              </a:rPr>
+              <a:t>Resulting Variable Set</a:t>
+            </a:r>
+          </a:p>
+        </p:txBody>
+      </p:sp>
+      <p:sp>
+        <p:nvSpPr>
+          <p:cNvPr id="8" name="TextBox 7">
+            <a:extLst>
+              <a:ext uri="{FF2B5EF4-FFF2-40B4-BE49-F238E27FC236}">
+                <a16:creationId xmlns:a16="http://schemas.microsoft.com/office/drawing/2014/main" id="{5393DB2E-894B-A22D-E1D6-A3F4A5BB9F01}"/>
+              </a:ext>
+            </a:extLst>
+          </p:cNvPr>
+          <p:cNvSpPr txBox="1"/>
+          <p:nvPr/>
+        </p:nvSpPr>
+        <p:spPr>
+          <a:xfrm>
+            <a:off x="2622589" y="1648494"/>
+            <a:ext cx="2133384" cy="4117605"/>
+          </a:xfrm>
+          <a:prstGeom prst="rect">
+            <a:avLst/>
+          </a:prstGeom>
+          <a:noFill/>
+          <a:ln>
+            <a:solidFill>
+              <a:srgbClr val="002060"/>
+            </a:solidFill>
+          </a:ln>
+        </p:spPr>
+        <p:txBody>
+          <a:bodyPr wrap="square" rtlCol="0">
+            <a:noAutofit/>
+          </a:bodyPr>
+          <a:lstStyle/>
+          <a:p>
+            <a:pPr algn="ctr"/>
+            <a:r>
+              <a:rPr lang="en-DE" sz="1400" dirty="0">
+                <a:solidFill>
+                  <a:srgbClr val="002060"/>
+                </a:solidFill>
+              </a:rPr>
+              <a:t>Filesystem Layout</a:t>
+            </a:r>
+          </a:p>
+        </p:txBody>
+      </p:sp>
+      <p:sp>
+        <p:nvSpPr>
           <p:cNvPr id="2" name="Title 1">
             <a:extLst>
               <a:ext uri="{FF2B5EF4-FFF2-40B4-BE49-F238E27FC236}">
@@ -4885,7 +5020,10 @@
           <a:bodyPr/>
           <a:lstStyle/>
           <a:p>
-            <a:endParaRPr lang="en-DE"/>
+            <a:r>
+              <a:rPr lang="en-DE" dirty="0"/>
+              <a:t>readme</a:t>
+            </a:r>
           </a:p>
         </p:txBody>
       </p:sp>
@@ -4903,8 +5041,8 @@
         </p:nvSpPr>
         <p:spPr>
           <a:xfrm>
-            <a:off x="1526837" y="2209978"/>
-            <a:ext cx="2642040" cy="2308324"/>
+            <a:off x="7134792" y="3061110"/>
+            <a:ext cx="1730538" cy="1277273"/>
           </a:xfrm>
           <a:prstGeom prst="rect">
             <a:avLst/>
@@ -4922,54 +5060,108 @@
           <a:lstStyle/>
           <a:p>
             <a:r>
-              <a:rPr lang="en-DE" dirty="0"/>
-              <a:t># final variable set</a:t>
-            </a:r>
-          </a:p>
-          <a:p>
-            <a:r>
-              <a:rPr lang="en-DE" dirty="0"/>
+              <a:rPr lang="en-DE" sz="1100" dirty="0"/>
               <a:t>export VAR_1=var_11</a:t>
             </a:r>
           </a:p>
           <a:p>
             <a:r>
-              <a:rPr lang="en-DE" dirty="0"/>
+              <a:rPr lang="en-DE" sz="1100" dirty="0"/>
               <a:t>export VAR_2=var_21</a:t>
             </a:r>
           </a:p>
           <a:p>
             <a:r>
-              <a:rPr lang="en-DE" dirty="0"/>
+              <a:rPr lang="en-DE" sz="1100" dirty="0"/>
               <a:t>export VAR_3=var_31</a:t>
             </a:r>
           </a:p>
           <a:p>
             <a:r>
-              <a:rPr lang="en-DE" dirty="0"/>
+              <a:rPr lang="en-DE" sz="1100" dirty="0"/>
               <a:t>export VAR_4=cloud_42</a:t>
             </a:r>
           </a:p>
           <a:p>
             <a:r>
-              <a:rPr lang="en-DE" dirty="0"/>
+              <a:rPr lang="en-DE" sz="1100" dirty="0"/>
               <a:t>export VAR_5=var_53</a:t>
             </a:r>
           </a:p>
           <a:p>
             <a:r>
-              <a:rPr lang="en-DE" dirty="0"/>
+              <a:rPr lang="en-DE" sz="1100" dirty="0"/>
               <a:t>export VAR_6=local_64</a:t>
             </a:r>
           </a:p>
           <a:p>
             <a:r>
-              <a:rPr lang="en-DE" dirty="0"/>
+              <a:rPr lang="en-DE" sz="1100" dirty="0"/>
               <a:t>export VAR_7=local_74</a:t>
             </a:r>
           </a:p>
         </p:txBody>
       </p:sp>
+      <p:pic>
+        <p:nvPicPr>
+          <p:cNvPr id="3" name="Picture 2">
+            <a:extLst>
+              <a:ext uri="{FF2B5EF4-FFF2-40B4-BE49-F238E27FC236}">
+                <a16:creationId xmlns:a16="http://schemas.microsoft.com/office/drawing/2014/main" id="{18CA8715-0B85-8557-7E62-A8503177A64A}"/>
+              </a:ext>
+            </a:extLst>
+          </p:cNvPr>
+          <p:cNvPicPr>
+            <a:picLocks noChangeAspect="1"/>
+          </p:cNvPicPr>
+          <p:nvPr/>
+        </p:nvPicPr>
+        <p:blipFill>
+          <a:blip r:embed="rId2"/>
+          <a:stretch>
+            <a:fillRect/>
+          </a:stretch>
+        </p:blipFill>
+        <p:spPr>
+          <a:xfrm>
+            <a:off x="2841509" y="3061110"/>
+            <a:ext cx="1669029" cy="1476785"/>
+          </a:xfrm>
+          <a:prstGeom prst="rect">
+            <a:avLst/>
+          </a:prstGeom>
+        </p:spPr>
+      </p:pic>
+      <p:pic>
+        <p:nvPicPr>
+          <p:cNvPr id="6" name="Picture 5">
+            <a:extLst>
+              <a:ext uri="{FF2B5EF4-FFF2-40B4-BE49-F238E27FC236}">
+                <a16:creationId xmlns:a16="http://schemas.microsoft.com/office/drawing/2014/main" id="{9D69F07D-CAE4-619D-B3E6-A41F3D7C35CA}"/>
+              </a:ext>
+            </a:extLst>
+          </p:cNvPr>
+          <p:cNvPicPr>
+            <a:picLocks noChangeAspect="1"/>
+          </p:cNvPicPr>
+          <p:nvPr/>
+        </p:nvPicPr>
+        <p:blipFill>
+          <a:blip r:embed="rId3"/>
+          <a:stretch>
+            <a:fillRect/>
+          </a:stretch>
+        </p:blipFill>
+        <p:spPr>
+          <a:xfrm>
+            <a:off x="5001408" y="2301010"/>
+            <a:ext cx="1730538" cy="3136028"/>
+          </a:xfrm>
+          <a:prstGeom prst="rect">
+            <a:avLst/>
+          </a:prstGeom>
+        </p:spPr>
+      </p:pic>
     </p:spTree>
     <p:extLst>
       <p:ext uri="{BB962C8B-B14F-4D97-AF65-F5344CB8AC3E}">

</xml_diff>

<commit_message>
feat: graph algorithm: bottom->top, right->left
</commit_message>
<xml_diff>
--- a/doc/rsenv.pptx
+++ b/doc/rsenv.pptx
@@ -11,6 +11,7 @@
     <p:sldId id="260" r:id="rId5"/>
     <p:sldId id="257" r:id="rId6"/>
     <p:sldId id="261" r:id="rId7"/>
+    <p:sldId id="262" r:id="rId8"/>
   </p:sldIdLst>
   <p:sldSz cx="12192000" cy="6858000"/>
   <p:notesSz cx="6858000" cy="9144000"/>
@@ -266,7 +267,7 @@
           <a:p>
             <a:fld id="{94EAEABD-DE79-9141-AFA2-A3447ADAF287}" type="datetimeFigureOut">
               <a:rPr lang="en-DE" smtClean="0"/>
-              <a:t>01.09.23</a:t>
+              <a:t>04.09.23</a:t>
             </a:fld>
             <a:endParaRPr lang="en-DE"/>
           </a:p>
@@ -466,7 +467,7 @@
           <a:p>
             <a:fld id="{94EAEABD-DE79-9141-AFA2-A3447ADAF287}" type="datetimeFigureOut">
               <a:rPr lang="en-DE" smtClean="0"/>
-              <a:t>01.09.23</a:t>
+              <a:t>04.09.23</a:t>
             </a:fld>
             <a:endParaRPr lang="en-DE"/>
           </a:p>
@@ -742,7 +743,7 @@
           <a:p>
             <a:fld id="{94EAEABD-DE79-9141-AFA2-A3447ADAF287}" type="datetimeFigureOut">
               <a:rPr lang="en-DE" smtClean="0"/>
-              <a:t>01.09.23</a:t>
+              <a:t>04.09.23</a:t>
             </a:fld>
             <a:endParaRPr lang="en-DE"/>
           </a:p>
@@ -1010,7 +1011,7 @@
           <a:p>
             <a:fld id="{94EAEABD-DE79-9141-AFA2-A3447ADAF287}" type="datetimeFigureOut">
               <a:rPr lang="en-DE" smtClean="0"/>
-              <a:t>01.09.23</a:t>
+              <a:t>04.09.23</a:t>
             </a:fld>
             <a:endParaRPr lang="en-DE"/>
           </a:p>
@@ -1425,7 +1426,7 @@
           <a:p>
             <a:fld id="{94EAEABD-DE79-9141-AFA2-A3447ADAF287}" type="datetimeFigureOut">
               <a:rPr lang="en-DE" smtClean="0"/>
-              <a:t>01.09.23</a:t>
+              <a:t>04.09.23</a:t>
             </a:fld>
             <a:endParaRPr lang="en-DE"/>
           </a:p>
@@ -1572,7 +1573,7 @@
           <a:p>
             <a:fld id="{94EAEABD-DE79-9141-AFA2-A3447ADAF287}" type="datetimeFigureOut">
               <a:rPr lang="en-DE" smtClean="0"/>
-              <a:t>01.09.23</a:t>
+              <a:t>04.09.23</a:t>
             </a:fld>
             <a:endParaRPr lang="en-DE"/>
           </a:p>
@@ -1685,7 +1686,7 @@
           <a:p>
             <a:fld id="{94EAEABD-DE79-9141-AFA2-A3447ADAF287}" type="datetimeFigureOut">
               <a:rPr lang="en-DE" smtClean="0"/>
-              <a:t>01.09.23</a:t>
+              <a:t>04.09.23</a:t>
             </a:fld>
             <a:endParaRPr lang="en-DE"/>
           </a:p>
@@ -1934,7 +1935,7 @@
           <a:p>
             <a:fld id="{94EAEABD-DE79-9141-AFA2-A3447ADAF287}" type="datetimeFigureOut">
               <a:rPr lang="en-DE" smtClean="0"/>
-              <a:t>01.09.23</a:t>
+              <a:t>04.09.23</a:t>
             </a:fld>
             <a:endParaRPr lang="en-DE"/>
           </a:p>
@@ -5775,6 +5776,866 @@
     <p:extLst>
       <p:ext uri="{BB962C8B-B14F-4D97-AF65-F5344CB8AC3E}">
         <p14:creationId xmlns:p14="http://schemas.microsoft.com/office/powerpoint/2010/main" val="1871946703"/>
+      </p:ext>
+    </p:extLst>
+  </p:cSld>
+  <p:clrMapOvr>
+    <a:masterClrMapping/>
+  </p:clrMapOvr>
+</p:sld>
+</file>
+
+<file path=ppt/slides/slide7.xml><?xml version="1.0" encoding="utf-8"?>
+<p:sld xmlns:a="http://schemas.openxmlformats.org/drawingml/2006/main" xmlns:r="http://schemas.openxmlformats.org/officeDocument/2006/relationships" xmlns:p="http://schemas.openxmlformats.org/presentationml/2006/main">
+  <p:cSld>
+    <p:spTree>
+      <p:nvGrpSpPr>
+        <p:cNvPr id="1" name=""/>
+        <p:cNvGrpSpPr/>
+        <p:nvPr/>
+      </p:nvGrpSpPr>
+      <p:grpSpPr>
+        <a:xfrm>
+          <a:off x="0" y="0"/>
+          <a:ext cx="0" cy="0"/>
+          <a:chOff x="0" y="0"/>
+          <a:chExt cx="0" cy="0"/>
+        </a:xfrm>
+      </p:grpSpPr>
+      <p:sp>
+        <p:nvSpPr>
+          <p:cNvPr id="2" name="Title 1">
+            <a:extLst>
+              <a:ext uri="{FF2B5EF4-FFF2-40B4-BE49-F238E27FC236}">
+                <a16:creationId xmlns:a16="http://schemas.microsoft.com/office/drawing/2014/main" id="{E46D1C12-3417-C985-4A52-F37C92FC67A1}"/>
+              </a:ext>
+            </a:extLst>
+          </p:cNvPr>
+          <p:cNvSpPr>
+            <a:spLocks noGrp="1"/>
+          </p:cNvSpPr>
+          <p:nvPr>
+            <p:ph type="title"/>
+          </p:nvPr>
+        </p:nvSpPr>
+        <p:spPr/>
+        <p:txBody>
+          <a:bodyPr/>
+          <a:lstStyle/>
+          <a:p>
+            <a:r>
+              <a:rPr lang="en-DE" dirty="0"/>
+              <a:t>graph.</a:t>
+            </a:r>
+          </a:p>
+        </p:txBody>
+      </p:sp>
+      <p:sp>
+        <p:nvSpPr>
+          <p:cNvPr id="4" name="Rectangle 3">
+            <a:extLst>
+              <a:ext uri="{FF2B5EF4-FFF2-40B4-BE49-F238E27FC236}">
+                <a16:creationId xmlns:a16="http://schemas.microsoft.com/office/drawing/2014/main" id="{00864637-FF4A-E123-C36A-8828E71EA0CD}"/>
+              </a:ext>
+            </a:extLst>
+          </p:cNvPr>
+          <p:cNvSpPr/>
+          <p:nvPr/>
+        </p:nvSpPr>
+        <p:spPr>
+          <a:xfrm>
+            <a:off x="4381348" y="207410"/>
+            <a:ext cx="1708302" cy="914400"/>
+          </a:xfrm>
+          <a:prstGeom prst="rect">
+            <a:avLst/>
+          </a:prstGeom>
+        </p:spPr>
+        <p:style>
+          <a:lnRef idx="2">
+            <a:schemeClr val="accent1">
+              <a:shade val="50000"/>
+            </a:schemeClr>
+          </a:lnRef>
+          <a:fillRef idx="1">
+            <a:schemeClr val="accent1"/>
+          </a:fillRef>
+          <a:effectRef idx="0">
+            <a:schemeClr val="accent1"/>
+          </a:effectRef>
+          <a:fontRef idx="minor">
+            <a:schemeClr val="lt1"/>
+          </a:fontRef>
+        </p:style>
+        <p:txBody>
+          <a:bodyPr wrap="none" rtlCol="0" anchor="ctr"/>
+          <a:lstStyle/>
+          <a:p>
+            <a:pPr algn="ctr"/>
+            <a:r>
+              <a:rPr lang="en-DE" sz="1100" dirty="0"/>
+              <a:t>root:</a:t>
+            </a:r>
+          </a:p>
+          <a:p>
+            <a:pPr algn="ctr"/>
+            <a:endParaRPr lang="en-DE" sz="1100" dirty="0"/>
+          </a:p>
+          <a:p>
+            <a:pPr algn="ctr"/>
+            <a:r>
+              <a:rPr lang="en-DE" sz="1100" dirty="0"/>
+              <a:t>root=root</a:t>
+            </a:r>
+          </a:p>
+        </p:txBody>
+      </p:sp>
+      <p:sp>
+        <p:nvSpPr>
+          <p:cNvPr id="5" name="Rectangle 4">
+            <a:extLst>
+              <a:ext uri="{FF2B5EF4-FFF2-40B4-BE49-F238E27FC236}">
+                <a16:creationId xmlns:a16="http://schemas.microsoft.com/office/drawing/2014/main" id="{7CD1F3D8-8876-EF2A-F1FA-5E39D620D96A}"/>
+              </a:ext>
+            </a:extLst>
+          </p:cNvPr>
+          <p:cNvSpPr/>
+          <p:nvPr/>
+        </p:nvSpPr>
+        <p:spPr>
+          <a:xfrm>
+            <a:off x="2420639" y="1922118"/>
+            <a:ext cx="1708302" cy="914400"/>
+          </a:xfrm>
+          <a:prstGeom prst="rect">
+            <a:avLst/>
+          </a:prstGeom>
+        </p:spPr>
+        <p:style>
+          <a:lnRef idx="2">
+            <a:schemeClr val="accent1">
+              <a:shade val="50000"/>
+            </a:schemeClr>
+          </a:lnRef>
+          <a:fillRef idx="1">
+            <a:schemeClr val="accent1"/>
+          </a:fillRef>
+          <a:effectRef idx="0">
+            <a:schemeClr val="accent1"/>
+          </a:effectRef>
+          <a:fontRef idx="minor">
+            <a:schemeClr val="lt1"/>
+          </a:fontRef>
+        </p:style>
+        <p:txBody>
+          <a:bodyPr wrap="none" rtlCol="0" anchor="ctr"/>
+          <a:lstStyle/>
+          <a:p>
+            <a:pPr algn="ctr"/>
+            <a:r>
+              <a:rPr lang="en-DE" sz="1100" dirty="0"/>
+              <a:t>level11:</a:t>
+            </a:r>
+          </a:p>
+          <a:p>
+            <a:pPr algn="ctr"/>
+            <a:endParaRPr lang="en-DE" sz="1100" dirty="0"/>
+          </a:p>
+          <a:p>
+            <a:pPr algn="ctr"/>
+            <a:r>
+              <a:rPr lang="en-DE" sz="1100" dirty="0"/>
+              <a:t>var11=11</a:t>
+            </a:r>
+          </a:p>
+        </p:txBody>
+      </p:sp>
+      <p:sp>
+        <p:nvSpPr>
+          <p:cNvPr id="6" name="Rectangle 5">
+            <a:extLst>
+              <a:ext uri="{FF2B5EF4-FFF2-40B4-BE49-F238E27FC236}">
+                <a16:creationId xmlns:a16="http://schemas.microsoft.com/office/drawing/2014/main" id="{17712227-750F-57E0-522A-CF0B5B0645ED}"/>
+              </a:ext>
+            </a:extLst>
+          </p:cNvPr>
+          <p:cNvSpPr/>
+          <p:nvPr/>
+        </p:nvSpPr>
+        <p:spPr>
+          <a:xfrm>
+            <a:off x="4387698" y="1922118"/>
+            <a:ext cx="1708302" cy="914400"/>
+          </a:xfrm>
+          <a:prstGeom prst="rect">
+            <a:avLst/>
+          </a:prstGeom>
+        </p:spPr>
+        <p:style>
+          <a:lnRef idx="2">
+            <a:schemeClr val="accent1">
+              <a:shade val="50000"/>
+            </a:schemeClr>
+          </a:lnRef>
+          <a:fillRef idx="1">
+            <a:schemeClr val="accent1"/>
+          </a:fillRef>
+          <a:effectRef idx="0">
+            <a:schemeClr val="accent1"/>
+          </a:effectRef>
+          <a:fontRef idx="minor">
+            <a:schemeClr val="lt1"/>
+          </a:fontRef>
+        </p:style>
+        <p:txBody>
+          <a:bodyPr wrap="none" rtlCol="0" anchor="ctr"/>
+          <a:lstStyle/>
+          <a:p>
+            <a:pPr algn="ctr"/>
+            <a:r>
+              <a:rPr lang="en-DE" sz="1100" dirty="0"/>
+              <a:t>level12:</a:t>
+            </a:r>
+          </a:p>
+          <a:p>
+            <a:pPr algn="ctr"/>
+            <a:endParaRPr lang="en-DE" sz="1100" dirty="0"/>
+          </a:p>
+          <a:p>
+            <a:pPr algn="ctr"/>
+            <a:r>
+              <a:rPr lang="en-DE" sz="1100" dirty="0"/>
+              <a:t>var12=12</a:t>
+            </a:r>
+          </a:p>
+        </p:txBody>
+      </p:sp>
+      <p:sp>
+        <p:nvSpPr>
+          <p:cNvPr id="7" name="Rectangle 6">
+            <a:extLst>
+              <a:ext uri="{FF2B5EF4-FFF2-40B4-BE49-F238E27FC236}">
+                <a16:creationId xmlns:a16="http://schemas.microsoft.com/office/drawing/2014/main" id="{6C2021A1-F0A9-589D-95BA-B43A077E386E}"/>
+              </a:ext>
+            </a:extLst>
+          </p:cNvPr>
+          <p:cNvSpPr/>
+          <p:nvPr/>
+        </p:nvSpPr>
+        <p:spPr>
+          <a:xfrm>
+            <a:off x="6354759" y="1922118"/>
+            <a:ext cx="1708302" cy="914400"/>
+          </a:xfrm>
+          <a:prstGeom prst="rect">
+            <a:avLst/>
+          </a:prstGeom>
+        </p:spPr>
+        <p:style>
+          <a:lnRef idx="2">
+            <a:schemeClr val="accent1">
+              <a:shade val="50000"/>
+            </a:schemeClr>
+          </a:lnRef>
+          <a:fillRef idx="1">
+            <a:schemeClr val="accent1"/>
+          </a:fillRef>
+          <a:effectRef idx="0">
+            <a:schemeClr val="accent1"/>
+          </a:effectRef>
+          <a:fontRef idx="minor">
+            <a:schemeClr val="lt1"/>
+          </a:fontRef>
+        </p:style>
+        <p:txBody>
+          <a:bodyPr wrap="none" rtlCol="0" anchor="ctr"/>
+          <a:lstStyle/>
+          <a:p>
+            <a:pPr algn="ctr"/>
+            <a:r>
+              <a:rPr lang="en-DE" sz="1100" dirty="0"/>
+              <a:t>level13:</a:t>
+            </a:r>
+          </a:p>
+          <a:p>
+            <a:pPr algn="ctr"/>
+            <a:endParaRPr lang="en-DE" sz="1100" dirty="0"/>
+          </a:p>
+          <a:p>
+            <a:pPr algn="ctr"/>
+            <a:r>
+              <a:rPr lang="en-DE" sz="1100" dirty="0"/>
+              <a:t>var13=13</a:t>
+            </a:r>
+          </a:p>
+        </p:txBody>
+      </p:sp>
+      <p:sp>
+        <p:nvSpPr>
+          <p:cNvPr id="8" name="Rectangle 7">
+            <a:extLst>
+              <a:ext uri="{FF2B5EF4-FFF2-40B4-BE49-F238E27FC236}">
+                <a16:creationId xmlns:a16="http://schemas.microsoft.com/office/drawing/2014/main" id="{D768FA1C-21FF-2AC5-5DFF-C177832EC7CE}"/>
+              </a:ext>
+            </a:extLst>
+          </p:cNvPr>
+          <p:cNvSpPr/>
+          <p:nvPr/>
+        </p:nvSpPr>
+        <p:spPr>
+          <a:xfrm>
+            <a:off x="4387698" y="3695307"/>
+            <a:ext cx="1708302" cy="914400"/>
+          </a:xfrm>
+          <a:prstGeom prst="rect">
+            <a:avLst/>
+          </a:prstGeom>
+        </p:spPr>
+        <p:style>
+          <a:lnRef idx="2">
+            <a:schemeClr val="accent1">
+              <a:shade val="50000"/>
+            </a:schemeClr>
+          </a:lnRef>
+          <a:fillRef idx="1">
+            <a:schemeClr val="accent1"/>
+          </a:fillRef>
+          <a:effectRef idx="0">
+            <a:schemeClr val="accent1"/>
+          </a:effectRef>
+          <a:fontRef idx="minor">
+            <a:schemeClr val="lt1"/>
+          </a:fontRef>
+        </p:style>
+        <p:txBody>
+          <a:bodyPr wrap="none" rtlCol="0" anchor="ctr"/>
+          <a:lstStyle/>
+          <a:p>
+            <a:pPr algn="ctr"/>
+            <a:r>
+              <a:rPr lang="en-DE" sz="1100" dirty="0"/>
+              <a:t>level21:</a:t>
+            </a:r>
+          </a:p>
+          <a:p>
+            <a:pPr algn="ctr"/>
+            <a:endParaRPr lang="en-DE" sz="1100" dirty="0"/>
+          </a:p>
+          <a:p>
+            <a:pPr algn="ctr"/>
+            <a:r>
+              <a:rPr lang="en-DE" sz="1100" dirty="0"/>
+              <a:t>var21=21</a:t>
+            </a:r>
+          </a:p>
+          <a:p>
+            <a:pPr algn="ctr"/>
+            <a:r>
+              <a:rPr lang="en-DE" sz="1100" dirty="0"/>
+              <a:t>root=21</a:t>
+            </a:r>
+          </a:p>
+        </p:txBody>
+      </p:sp>
+      <p:cxnSp>
+        <p:nvCxnSpPr>
+          <p:cNvPr id="10" name="Elbow Connector 9">
+            <a:extLst>
+              <a:ext uri="{FF2B5EF4-FFF2-40B4-BE49-F238E27FC236}">
+                <a16:creationId xmlns:a16="http://schemas.microsoft.com/office/drawing/2014/main" id="{A55DAA63-182E-A163-51B3-01369A652B51}"/>
+              </a:ext>
+            </a:extLst>
+          </p:cNvPr>
+          <p:cNvCxnSpPr>
+            <a:stCxn id="8" idx="0"/>
+            <a:endCxn id="5" idx="2"/>
+          </p:cNvCxnSpPr>
+          <p:nvPr/>
+        </p:nvCxnSpPr>
+        <p:spPr>
+          <a:xfrm rot="16200000" flipV="1">
+            <a:off x="3828926" y="2282383"/>
+            <a:ext cx="858789" cy="1967059"/>
+          </a:xfrm>
+          <a:prstGeom prst="bentConnector3">
+            <a:avLst/>
+          </a:prstGeom>
+          <a:ln w="12700">
+            <a:solidFill>
+              <a:schemeClr val="bg1"/>
+            </a:solidFill>
+            <a:tailEnd type="triangle"/>
+          </a:ln>
+        </p:spPr>
+        <p:style>
+          <a:lnRef idx="1">
+            <a:schemeClr val="accent1"/>
+          </a:lnRef>
+          <a:fillRef idx="0">
+            <a:schemeClr val="accent1"/>
+          </a:fillRef>
+          <a:effectRef idx="0">
+            <a:schemeClr val="accent1"/>
+          </a:effectRef>
+          <a:fontRef idx="minor">
+            <a:schemeClr val="tx1"/>
+          </a:fontRef>
+        </p:style>
+      </p:cxnSp>
+      <p:cxnSp>
+        <p:nvCxnSpPr>
+          <p:cNvPr id="11" name="Elbow Connector 10">
+            <a:extLst>
+              <a:ext uri="{FF2B5EF4-FFF2-40B4-BE49-F238E27FC236}">
+                <a16:creationId xmlns:a16="http://schemas.microsoft.com/office/drawing/2014/main" id="{945CA1AF-9C66-0A7C-9102-6FAEAAF0A971}"/>
+              </a:ext>
+            </a:extLst>
+          </p:cNvPr>
+          <p:cNvCxnSpPr>
+            <a:cxnSpLocks/>
+            <a:stCxn id="8" idx="0"/>
+            <a:endCxn id="6" idx="2"/>
+          </p:cNvCxnSpPr>
+          <p:nvPr/>
+        </p:nvCxnSpPr>
+        <p:spPr>
+          <a:xfrm rot="5400000" flipH="1" flipV="1">
+            <a:off x="4812455" y="3265913"/>
+            <a:ext cx="858789" cy="12700"/>
+          </a:xfrm>
+          <a:prstGeom prst="bentConnector3">
+            <a:avLst/>
+          </a:prstGeom>
+          <a:ln w="12700">
+            <a:solidFill>
+              <a:schemeClr val="bg1"/>
+            </a:solidFill>
+            <a:tailEnd type="triangle"/>
+          </a:ln>
+        </p:spPr>
+        <p:style>
+          <a:lnRef idx="1">
+            <a:schemeClr val="accent1"/>
+          </a:lnRef>
+          <a:fillRef idx="0">
+            <a:schemeClr val="accent1"/>
+          </a:fillRef>
+          <a:effectRef idx="0">
+            <a:schemeClr val="accent1"/>
+          </a:effectRef>
+          <a:fontRef idx="minor">
+            <a:schemeClr val="tx1"/>
+          </a:fontRef>
+        </p:style>
+      </p:cxnSp>
+      <p:cxnSp>
+        <p:nvCxnSpPr>
+          <p:cNvPr id="14" name="Elbow Connector 13">
+            <a:extLst>
+              <a:ext uri="{FF2B5EF4-FFF2-40B4-BE49-F238E27FC236}">
+                <a16:creationId xmlns:a16="http://schemas.microsoft.com/office/drawing/2014/main" id="{8E53860E-92EA-B2A8-3843-A5D36F98E9E9}"/>
+              </a:ext>
+            </a:extLst>
+          </p:cNvPr>
+          <p:cNvCxnSpPr>
+            <a:cxnSpLocks/>
+            <a:stCxn id="8" idx="0"/>
+            <a:endCxn id="7" idx="2"/>
+          </p:cNvCxnSpPr>
+          <p:nvPr/>
+        </p:nvCxnSpPr>
+        <p:spPr>
+          <a:xfrm rot="5400000" flipH="1" flipV="1">
+            <a:off x="5795985" y="2282383"/>
+            <a:ext cx="858789" cy="1967061"/>
+          </a:xfrm>
+          <a:prstGeom prst="bentConnector3">
+            <a:avLst>
+              <a:gd name="adj1" fmla="val 50000"/>
+            </a:avLst>
+          </a:prstGeom>
+          <a:ln w="12700">
+            <a:solidFill>
+              <a:schemeClr val="bg1"/>
+            </a:solidFill>
+            <a:tailEnd type="triangle"/>
+          </a:ln>
+        </p:spPr>
+        <p:style>
+          <a:lnRef idx="1">
+            <a:schemeClr val="accent1"/>
+          </a:lnRef>
+          <a:fillRef idx="0">
+            <a:schemeClr val="accent1"/>
+          </a:fillRef>
+          <a:effectRef idx="0">
+            <a:schemeClr val="accent1"/>
+          </a:effectRef>
+          <a:fontRef idx="minor">
+            <a:schemeClr val="tx1"/>
+          </a:fontRef>
+        </p:style>
+      </p:cxnSp>
+      <p:cxnSp>
+        <p:nvCxnSpPr>
+          <p:cNvPr id="20" name="Elbow Connector 19">
+            <a:extLst>
+              <a:ext uri="{FF2B5EF4-FFF2-40B4-BE49-F238E27FC236}">
+                <a16:creationId xmlns:a16="http://schemas.microsoft.com/office/drawing/2014/main" id="{228F4171-E019-60FE-D924-A33E599FB641}"/>
+              </a:ext>
+            </a:extLst>
+          </p:cNvPr>
+          <p:cNvCxnSpPr>
+            <a:cxnSpLocks/>
+            <a:stCxn id="5" idx="0"/>
+            <a:endCxn id="4" idx="2"/>
+          </p:cNvCxnSpPr>
+          <p:nvPr/>
+        </p:nvCxnSpPr>
+        <p:spPr>
+          <a:xfrm rot="5400000" flipH="1" flipV="1">
+            <a:off x="3854990" y="541610"/>
+            <a:ext cx="800308" cy="1960709"/>
+          </a:xfrm>
+          <a:prstGeom prst="bentConnector3">
+            <a:avLst>
+              <a:gd name="adj1" fmla="val 50000"/>
+            </a:avLst>
+          </a:prstGeom>
+          <a:ln w="12700">
+            <a:solidFill>
+              <a:schemeClr val="bg1"/>
+            </a:solidFill>
+            <a:tailEnd type="triangle"/>
+          </a:ln>
+        </p:spPr>
+        <p:style>
+          <a:lnRef idx="1">
+            <a:schemeClr val="accent1"/>
+          </a:lnRef>
+          <a:fillRef idx="0">
+            <a:schemeClr val="accent1"/>
+          </a:fillRef>
+          <a:effectRef idx="0">
+            <a:schemeClr val="accent1"/>
+          </a:effectRef>
+          <a:fontRef idx="minor">
+            <a:schemeClr val="tx1"/>
+          </a:fontRef>
+        </p:style>
+      </p:cxnSp>
+      <p:cxnSp>
+        <p:nvCxnSpPr>
+          <p:cNvPr id="21" name="Elbow Connector 20">
+            <a:extLst>
+              <a:ext uri="{FF2B5EF4-FFF2-40B4-BE49-F238E27FC236}">
+                <a16:creationId xmlns:a16="http://schemas.microsoft.com/office/drawing/2014/main" id="{4BFDF492-FD2D-B767-5ABA-D12064572FD9}"/>
+              </a:ext>
+            </a:extLst>
+          </p:cNvPr>
+          <p:cNvCxnSpPr>
+            <a:cxnSpLocks/>
+            <a:stCxn id="6" idx="0"/>
+            <a:endCxn id="4" idx="2"/>
+          </p:cNvCxnSpPr>
+          <p:nvPr/>
+        </p:nvCxnSpPr>
+        <p:spPr>
+          <a:xfrm rot="16200000" flipV="1">
+            <a:off x="4838520" y="1518789"/>
+            <a:ext cx="800308" cy="6350"/>
+          </a:xfrm>
+          <a:prstGeom prst="bentConnector3">
+            <a:avLst>
+              <a:gd name="adj1" fmla="val 50000"/>
+            </a:avLst>
+          </a:prstGeom>
+          <a:ln w="12700">
+            <a:solidFill>
+              <a:schemeClr val="bg1"/>
+            </a:solidFill>
+            <a:tailEnd type="triangle"/>
+          </a:ln>
+        </p:spPr>
+        <p:style>
+          <a:lnRef idx="1">
+            <a:schemeClr val="accent1"/>
+          </a:lnRef>
+          <a:fillRef idx="0">
+            <a:schemeClr val="accent1"/>
+          </a:fillRef>
+          <a:effectRef idx="0">
+            <a:schemeClr val="accent1"/>
+          </a:effectRef>
+          <a:fontRef idx="minor">
+            <a:schemeClr val="tx1"/>
+          </a:fontRef>
+        </p:style>
+      </p:cxnSp>
+      <p:cxnSp>
+        <p:nvCxnSpPr>
+          <p:cNvPr id="22" name="Elbow Connector 21">
+            <a:extLst>
+              <a:ext uri="{FF2B5EF4-FFF2-40B4-BE49-F238E27FC236}">
+                <a16:creationId xmlns:a16="http://schemas.microsoft.com/office/drawing/2014/main" id="{CA6A4822-3483-D3F7-E265-CCA8530199DD}"/>
+              </a:ext>
+            </a:extLst>
+          </p:cNvPr>
+          <p:cNvCxnSpPr>
+            <a:cxnSpLocks/>
+            <a:stCxn id="7" idx="0"/>
+            <a:endCxn id="4" idx="2"/>
+          </p:cNvCxnSpPr>
+          <p:nvPr/>
+        </p:nvCxnSpPr>
+        <p:spPr>
+          <a:xfrm rot="16200000" flipV="1">
+            <a:off x="5822051" y="535258"/>
+            <a:ext cx="800308" cy="1973411"/>
+          </a:xfrm>
+          <a:prstGeom prst="bentConnector3">
+            <a:avLst>
+              <a:gd name="adj1" fmla="val 50000"/>
+            </a:avLst>
+          </a:prstGeom>
+          <a:ln w="12700">
+            <a:solidFill>
+              <a:schemeClr val="bg1"/>
+            </a:solidFill>
+            <a:tailEnd type="triangle"/>
+          </a:ln>
+        </p:spPr>
+        <p:style>
+          <a:lnRef idx="1">
+            <a:schemeClr val="accent1"/>
+          </a:lnRef>
+          <a:fillRef idx="0">
+            <a:schemeClr val="accent1"/>
+          </a:fillRef>
+          <a:effectRef idx="0">
+            <a:schemeClr val="accent1"/>
+          </a:effectRef>
+          <a:fontRef idx="minor">
+            <a:schemeClr val="tx1"/>
+          </a:fontRef>
+        </p:style>
+      </p:cxnSp>
+      <p:sp>
+        <p:nvSpPr>
+          <p:cNvPr id="32" name="Rectangle 31">
+            <a:extLst>
+              <a:ext uri="{FF2B5EF4-FFF2-40B4-BE49-F238E27FC236}">
+                <a16:creationId xmlns:a16="http://schemas.microsoft.com/office/drawing/2014/main" id="{78A11171-E4E8-9681-0065-8BB2BCAAA6CD}"/>
+              </a:ext>
+            </a:extLst>
+          </p:cNvPr>
+          <p:cNvSpPr/>
+          <p:nvPr/>
+        </p:nvSpPr>
+        <p:spPr>
+          <a:xfrm>
+            <a:off x="7208910" y="5242875"/>
+            <a:ext cx="1708302" cy="914400"/>
+          </a:xfrm>
+          <a:prstGeom prst="rect">
+            <a:avLst/>
+          </a:prstGeom>
+        </p:spPr>
+        <p:style>
+          <a:lnRef idx="2">
+            <a:schemeClr val="accent1">
+              <a:shade val="50000"/>
+            </a:schemeClr>
+          </a:lnRef>
+          <a:fillRef idx="1">
+            <a:schemeClr val="accent1"/>
+          </a:fillRef>
+          <a:effectRef idx="0">
+            <a:schemeClr val="accent1"/>
+          </a:effectRef>
+          <a:fontRef idx="minor">
+            <a:schemeClr val="lt1"/>
+          </a:fontRef>
+        </p:style>
+        <p:txBody>
+          <a:bodyPr wrap="none" rtlCol="0" anchor="ctr"/>
+          <a:lstStyle/>
+          <a:p>
+            <a:pPr algn="ctr"/>
+            <a:r>
+              <a:rPr lang="en-DE" sz="1100" dirty="0"/>
+              <a:t>level31:</a:t>
+            </a:r>
+          </a:p>
+          <a:p>
+            <a:pPr algn="ctr"/>
+            <a:endParaRPr lang="en-DE" sz="1100" dirty="0"/>
+          </a:p>
+          <a:p>
+            <a:pPr algn="ctr"/>
+            <a:r>
+              <a:rPr lang="en-DE" sz="1100" dirty="0"/>
+              <a:t>var31=31</a:t>
+            </a:r>
+          </a:p>
+          <a:p>
+            <a:pPr algn="ctr"/>
+            <a:r>
+              <a:rPr lang="en-DE" sz="1100" dirty="0"/>
+              <a:t>root=31</a:t>
+            </a:r>
+          </a:p>
+        </p:txBody>
+      </p:sp>
+      <p:cxnSp>
+        <p:nvCxnSpPr>
+          <p:cNvPr id="33" name="Elbow Connector 32">
+            <a:extLst>
+              <a:ext uri="{FF2B5EF4-FFF2-40B4-BE49-F238E27FC236}">
+                <a16:creationId xmlns:a16="http://schemas.microsoft.com/office/drawing/2014/main" id="{ADF261B1-5FFA-279E-49DB-5ACE86FE3B14}"/>
+              </a:ext>
+            </a:extLst>
+          </p:cNvPr>
+          <p:cNvCxnSpPr>
+            <a:cxnSpLocks/>
+            <a:stCxn id="32" idx="0"/>
+            <a:endCxn id="8" idx="2"/>
+          </p:cNvCxnSpPr>
+          <p:nvPr/>
+        </p:nvCxnSpPr>
+        <p:spPr>
+          <a:xfrm rot="16200000" flipV="1">
+            <a:off x="6335871" y="3515685"/>
+            <a:ext cx="633168" cy="2821212"/>
+          </a:xfrm>
+          <a:prstGeom prst="bentConnector3">
+            <a:avLst>
+              <a:gd name="adj1" fmla="val 50000"/>
+            </a:avLst>
+          </a:prstGeom>
+          <a:ln w="12700">
+            <a:solidFill>
+              <a:schemeClr val="bg1"/>
+            </a:solidFill>
+            <a:tailEnd type="triangle"/>
+          </a:ln>
+        </p:spPr>
+        <p:style>
+          <a:lnRef idx="1">
+            <a:schemeClr val="accent1"/>
+          </a:lnRef>
+          <a:fillRef idx="0">
+            <a:schemeClr val="accent1"/>
+          </a:fillRef>
+          <a:effectRef idx="0">
+            <a:schemeClr val="accent1"/>
+          </a:effectRef>
+          <a:fontRef idx="minor">
+            <a:schemeClr val="tx1"/>
+          </a:fontRef>
+        </p:style>
+      </p:cxnSp>
+      <p:cxnSp>
+        <p:nvCxnSpPr>
+          <p:cNvPr id="36" name="Elbow Connector 35">
+            <a:extLst>
+              <a:ext uri="{FF2B5EF4-FFF2-40B4-BE49-F238E27FC236}">
+                <a16:creationId xmlns:a16="http://schemas.microsoft.com/office/drawing/2014/main" id="{F3DEB93E-D8EF-C99B-2327-5997D667D7AE}"/>
+              </a:ext>
+            </a:extLst>
+          </p:cNvPr>
+          <p:cNvCxnSpPr>
+            <a:cxnSpLocks/>
+            <a:stCxn id="32" idx="3"/>
+            <a:endCxn id="4" idx="3"/>
+          </p:cNvCxnSpPr>
+          <p:nvPr/>
+        </p:nvCxnSpPr>
+        <p:spPr>
+          <a:xfrm flipH="1" flipV="1">
+            <a:off x="6089650" y="664610"/>
+            <a:ext cx="2827562" cy="5035465"/>
+          </a:xfrm>
+          <a:prstGeom prst="bentConnector3">
+            <a:avLst>
+              <a:gd name="adj1" fmla="val -8085"/>
+            </a:avLst>
+          </a:prstGeom>
+          <a:ln w="12700">
+            <a:solidFill>
+              <a:schemeClr val="bg1"/>
+            </a:solidFill>
+            <a:tailEnd type="triangle"/>
+          </a:ln>
+        </p:spPr>
+        <p:style>
+          <a:lnRef idx="1">
+            <a:schemeClr val="accent1"/>
+          </a:lnRef>
+          <a:fillRef idx="0">
+            <a:schemeClr val="accent1"/>
+          </a:fillRef>
+          <a:effectRef idx="0">
+            <a:schemeClr val="accent1"/>
+          </a:effectRef>
+          <a:fontRef idx="minor">
+            <a:schemeClr val="tx1"/>
+          </a:fontRef>
+        </p:style>
+      </p:cxnSp>
+      <p:cxnSp>
+        <p:nvCxnSpPr>
+          <p:cNvPr id="46" name="Elbow Connector 45">
+            <a:extLst>
+              <a:ext uri="{FF2B5EF4-FFF2-40B4-BE49-F238E27FC236}">
+                <a16:creationId xmlns:a16="http://schemas.microsoft.com/office/drawing/2014/main" id="{AA9DC1D8-3472-AABE-74E6-6AD6B3298299}"/>
+              </a:ext>
+            </a:extLst>
+          </p:cNvPr>
+          <p:cNvCxnSpPr>
+            <a:cxnSpLocks/>
+            <a:stCxn id="7" idx="3"/>
+            <a:endCxn id="32" idx="2"/>
+          </p:cNvCxnSpPr>
+          <p:nvPr/>
+        </p:nvCxnSpPr>
+        <p:spPr>
+          <a:xfrm>
+            <a:off x="8063061" y="2379318"/>
+            <a:ext cx="12700" cy="3777957"/>
+          </a:xfrm>
+          <a:prstGeom prst="bentConnector4">
+            <a:avLst>
+              <a:gd name="adj1" fmla="val 14113575"/>
+              <a:gd name="adj2" fmla="val 106051"/>
+            </a:avLst>
+          </a:prstGeom>
+          <a:ln w="12700">
+            <a:solidFill>
+              <a:schemeClr val="bg1"/>
+            </a:solidFill>
+            <a:tailEnd type="triangle"/>
+          </a:ln>
+        </p:spPr>
+        <p:style>
+          <a:lnRef idx="1">
+            <a:schemeClr val="accent1"/>
+          </a:lnRef>
+          <a:fillRef idx="0">
+            <a:schemeClr val="accent1"/>
+          </a:fillRef>
+          <a:effectRef idx="0">
+            <a:schemeClr val="accent1"/>
+          </a:effectRef>
+          <a:fontRef idx="minor">
+            <a:schemeClr val="tx1"/>
+          </a:fontRef>
+        </p:style>
+      </p:cxnSp>
+    </p:spTree>
+    <p:extLst>
+      <p:ext uri="{BB962C8B-B14F-4D97-AF65-F5344CB8AC3E}">
+        <p14:creationId xmlns:p14="http://schemas.microsoft.com/office/powerpoint/2010/main" val="3715750635"/>
       </p:ext>
     </p:extLst>
   </p:cSld>

</xml_diff>